<commit_message>
Informe 3 Caso de Uso Compra
</commit_message>
<xml_diff>
--- a/entrega anterior/graficos.pptx
+++ b/entrega anterior/graficos.pptx
@@ -298,7 +298,7 @@
           <a:p>
             <a:fld id="{74BAEB3C-D211-4E6F-9954-3A9DA3C9E590}" type="datetimeFigureOut">
               <a:rPr lang="es-ES" smtClean="0"/>
-              <a:t>22/05/2013</a:t>
+              <a:t>02/07/2013</a:t>
             </a:fld>
             <a:endParaRPr lang="es-ES"/>
           </a:p>
@@ -468,7 +468,7 @@
           <a:p>
             <a:fld id="{74BAEB3C-D211-4E6F-9954-3A9DA3C9E590}" type="datetimeFigureOut">
               <a:rPr lang="es-ES" smtClean="0"/>
-              <a:t>22/05/2013</a:t>
+              <a:t>02/07/2013</a:t>
             </a:fld>
             <a:endParaRPr lang="es-ES"/>
           </a:p>
@@ -648,7 +648,7 @@
           <a:p>
             <a:fld id="{74BAEB3C-D211-4E6F-9954-3A9DA3C9E590}" type="datetimeFigureOut">
               <a:rPr lang="es-ES" smtClean="0"/>
-              <a:t>22/05/2013</a:t>
+              <a:t>02/07/2013</a:t>
             </a:fld>
             <a:endParaRPr lang="es-ES"/>
           </a:p>
@@ -818,7 +818,7 @@
           <a:p>
             <a:fld id="{74BAEB3C-D211-4E6F-9954-3A9DA3C9E590}" type="datetimeFigureOut">
               <a:rPr lang="es-ES" smtClean="0"/>
-              <a:t>22/05/2013</a:t>
+              <a:t>02/07/2013</a:t>
             </a:fld>
             <a:endParaRPr lang="es-ES"/>
           </a:p>
@@ -1064,7 +1064,7 @@
           <a:p>
             <a:fld id="{74BAEB3C-D211-4E6F-9954-3A9DA3C9E590}" type="datetimeFigureOut">
               <a:rPr lang="es-ES" smtClean="0"/>
-              <a:t>22/05/2013</a:t>
+              <a:t>02/07/2013</a:t>
             </a:fld>
             <a:endParaRPr lang="es-ES"/>
           </a:p>
@@ -1352,7 +1352,7 @@
           <a:p>
             <a:fld id="{74BAEB3C-D211-4E6F-9954-3A9DA3C9E590}" type="datetimeFigureOut">
               <a:rPr lang="es-ES" smtClean="0"/>
-              <a:t>22/05/2013</a:t>
+              <a:t>02/07/2013</a:t>
             </a:fld>
             <a:endParaRPr lang="es-ES"/>
           </a:p>
@@ -1774,7 +1774,7 @@
           <a:p>
             <a:fld id="{74BAEB3C-D211-4E6F-9954-3A9DA3C9E590}" type="datetimeFigureOut">
               <a:rPr lang="es-ES" smtClean="0"/>
-              <a:t>22/05/2013</a:t>
+              <a:t>02/07/2013</a:t>
             </a:fld>
             <a:endParaRPr lang="es-ES"/>
           </a:p>
@@ -1892,7 +1892,7 @@
           <a:p>
             <a:fld id="{74BAEB3C-D211-4E6F-9954-3A9DA3C9E590}" type="datetimeFigureOut">
               <a:rPr lang="es-ES" smtClean="0"/>
-              <a:t>22/05/2013</a:t>
+              <a:t>02/07/2013</a:t>
             </a:fld>
             <a:endParaRPr lang="es-ES"/>
           </a:p>
@@ -1987,7 +1987,7 @@
           <a:p>
             <a:fld id="{74BAEB3C-D211-4E6F-9954-3A9DA3C9E590}" type="datetimeFigureOut">
               <a:rPr lang="es-ES" smtClean="0"/>
-              <a:t>22/05/2013</a:t>
+              <a:t>02/07/2013</a:t>
             </a:fld>
             <a:endParaRPr lang="es-ES"/>
           </a:p>
@@ -2264,7 +2264,7 @@
           <a:p>
             <a:fld id="{74BAEB3C-D211-4E6F-9954-3A9DA3C9E590}" type="datetimeFigureOut">
               <a:rPr lang="es-ES" smtClean="0"/>
-              <a:t>22/05/2013</a:t>
+              <a:t>02/07/2013</a:t>
             </a:fld>
             <a:endParaRPr lang="es-ES"/>
           </a:p>
@@ -2517,7 +2517,7 @@
           <a:p>
             <a:fld id="{74BAEB3C-D211-4E6F-9954-3A9DA3C9E590}" type="datetimeFigureOut">
               <a:rPr lang="es-ES" smtClean="0"/>
-              <a:t>22/05/2013</a:t>
+              <a:t>02/07/2013</a:t>
             </a:fld>
             <a:endParaRPr lang="es-ES"/>
           </a:p>
@@ -2730,7 +2730,7 @@
           <a:p>
             <a:fld id="{74BAEB3C-D211-4E6F-9954-3A9DA3C9E590}" type="datetimeFigureOut">
               <a:rPr lang="es-ES" smtClean="0"/>
-              <a:t>22/05/2013</a:t>
+              <a:t>02/07/2013</a:t>
             </a:fld>
             <a:endParaRPr lang="es-ES"/>
           </a:p>
@@ -3387,70 +3387,6 @@
           </a:p>
         </p:txBody>
       </p:sp>
-      <p:pic>
-        <p:nvPicPr>
-          <p:cNvPr id="10242" name="Picture 2"/>
-          <p:cNvPicPr>
-            <a:picLocks noChangeAspect="1" noChangeArrowheads="1"/>
-          </p:cNvPicPr>
-          <p:nvPr/>
-        </p:nvPicPr>
-        <p:blipFill>
-          <a:blip r:embed="rId2">
-            <a:extLst>
-              <a:ext uri="{28A0092B-C50C-407E-A947-70E740481C1C}">
-                <a14:useLocalDpi xmlns:a14="http://schemas.microsoft.com/office/drawing/2010/main" val="0"/>
-              </a:ext>
-            </a:extLst>
-          </a:blip>
-          <a:srcRect/>
-          <a:stretch>
-            <a:fillRect/>
-          </a:stretch>
-        </p:blipFill>
-        <p:spPr bwMode="auto">
-          <a:xfrm>
-            <a:off x="611561" y="1113498"/>
-            <a:ext cx="8150762" cy="4763773"/>
-          </a:xfrm>
-          <a:prstGeom prst="rect">
-            <a:avLst/>
-          </a:prstGeom>
-          <a:noFill/>
-          <a:ln>
-            <a:noFill/>
-          </a:ln>
-          <a:effectLst/>
-          <a:extLst>
-            <a:ext uri="{909E8E84-426E-40DD-AFC4-6F175D3DCCD1}">
-              <a14:hiddenFill xmlns:a14="http://schemas.microsoft.com/office/drawing/2010/main">
-                <a:solidFill>
-                  <a:schemeClr val="accent1"/>
-                </a:solidFill>
-              </a14:hiddenFill>
-            </a:ext>
-            <a:ext uri="{91240B29-F687-4F45-9708-019B960494DF}">
-              <a14:hiddenLine xmlns:a14="http://schemas.microsoft.com/office/drawing/2010/main" w="9525">
-                <a:solidFill>
-                  <a:schemeClr val="tx1"/>
-                </a:solidFill>
-                <a:miter lim="800000"/>
-                <a:headEnd/>
-                <a:tailEnd/>
-              </a14:hiddenLine>
-            </a:ext>
-            <a:ext uri="{AF507438-7753-43E0-B8FC-AC1667EBCBE1}">
-              <a14:hiddenEffects xmlns:a14="http://schemas.microsoft.com/office/drawing/2010/main">
-                <a:effectLst>
-                  <a:outerShdw dist="35921" dir="2700000" algn="ctr" rotWithShape="0">
-                    <a:schemeClr val="bg2"/>
-                  </a:outerShdw>
-                </a:effectLst>
-              </a14:hiddenEffects>
-            </a:ext>
-          </a:extLst>
-        </p:spPr>
-      </p:pic>
     </p:spTree>
     <p:extLst>
       <p:ext uri="{BB962C8B-B14F-4D97-AF65-F5344CB8AC3E}">
@@ -4127,7 +4063,12 @@
             <p:ph idx="1"/>
           </p:nvPr>
         </p:nvSpPr>
-        <p:spPr/>
+        <p:spPr>
+          <a:xfrm>
+            <a:off x="323528" y="1556792"/>
+            <a:ext cx="8229600" cy="4525963"/>
+          </a:xfrm>
+        </p:spPr>
         <p:txBody>
           <a:bodyPr>
             <a:normAutofit fontScale="47500" lnSpcReduction="20000"/>

</xml_diff>